<commit_message>
Collapse all Labs on the Ribbon #1405  (#1440)
* Change new ribbon ui

* Add Paste Lab supertips

* Update Hide Shape icon

* Resize ribbon icons

* Resize dropdown icons

* Add groupings for ribbon buttons
</commit_message>
<xml_diff>
--- a/doc/Icons-AnimationLab.pptx
+++ b/doc/Icons-AnimationLab.pptx
@@ -221,7 +221,7 @@
           <a:p>
             <a:fld id="{6699ACB9-486C-4D62-A3A7-AF98E13EFDA3}" type="datetimeFigureOut">
               <a:rPr lang="en-US" smtClean="0"/>
-              <a:t>6/6/2017</a:t>
+              <a:t>6/13/2017</a:t>
             </a:fld>
             <a:endParaRPr lang="en-US"/>
           </a:p>
@@ -752,7 +752,7 @@
             <a:fld id="{1D8BD707-D9CF-40AE-B4C6-C98DA3205C09}" type="datetimeFigureOut">
               <a:rPr lang="en-US" smtClean="0"/>
               <a:pPr/>
-              <a:t>6/6/2017</a:t>
+              <a:t>6/13/2017</a:t>
             </a:fld>
             <a:endParaRPr lang="en-US"/>
           </a:p>
@@ -917,7 +917,7 @@
             <a:fld id="{1D8BD707-D9CF-40AE-B4C6-C98DA3205C09}" type="datetimeFigureOut">
               <a:rPr lang="en-US" smtClean="0"/>
               <a:pPr/>
-              <a:t>6/6/2017</a:t>
+              <a:t>6/13/2017</a:t>
             </a:fld>
             <a:endParaRPr lang="en-US"/>
           </a:p>
@@ -1092,7 +1092,7 @@
             <a:fld id="{1D8BD707-D9CF-40AE-B4C6-C98DA3205C09}" type="datetimeFigureOut">
               <a:rPr lang="en-US" smtClean="0"/>
               <a:pPr/>
-              <a:t>6/6/2017</a:t>
+              <a:t>6/13/2017</a:t>
             </a:fld>
             <a:endParaRPr lang="en-US"/>
           </a:p>
@@ -1257,7 +1257,7 @@
             <a:fld id="{1D8BD707-D9CF-40AE-B4C6-C98DA3205C09}" type="datetimeFigureOut">
               <a:rPr lang="en-US" smtClean="0"/>
               <a:pPr/>
-              <a:t>6/6/2017</a:t>
+              <a:t>6/13/2017</a:t>
             </a:fld>
             <a:endParaRPr lang="en-US"/>
           </a:p>
@@ -1499,7 +1499,7 @@
             <a:fld id="{1D8BD707-D9CF-40AE-B4C6-C98DA3205C09}" type="datetimeFigureOut">
               <a:rPr lang="en-US" smtClean="0"/>
               <a:pPr/>
-              <a:t>6/6/2017</a:t>
+              <a:t>6/13/2017</a:t>
             </a:fld>
             <a:endParaRPr lang="en-US"/>
           </a:p>
@@ -1781,7 +1781,7 @@
             <a:fld id="{1D8BD707-D9CF-40AE-B4C6-C98DA3205C09}" type="datetimeFigureOut">
               <a:rPr lang="en-US" smtClean="0"/>
               <a:pPr/>
-              <a:t>6/6/2017</a:t>
+              <a:t>6/13/2017</a:t>
             </a:fld>
             <a:endParaRPr lang="en-US"/>
           </a:p>
@@ -2197,7 +2197,7 @@
             <a:fld id="{1D8BD707-D9CF-40AE-B4C6-C98DA3205C09}" type="datetimeFigureOut">
               <a:rPr lang="en-US" smtClean="0"/>
               <a:pPr/>
-              <a:t>6/6/2017</a:t>
+              <a:t>6/13/2017</a:t>
             </a:fld>
             <a:endParaRPr lang="en-US"/>
           </a:p>
@@ -2311,7 +2311,7 @@
             <a:fld id="{1D8BD707-D9CF-40AE-B4C6-C98DA3205C09}" type="datetimeFigureOut">
               <a:rPr lang="en-US" smtClean="0"/>
               <a:pPr/>
-              <a:t>6/6/2017</a:t>
+              <a:t>6/13/2017</a:t>
             </a:fld>
             <a:endParaRPr lang="en-US"/>
           </a:p>
@@ -2403,7 +2403,7 @@
             <a:fld id="{1D8BD707-D9CF-40AE-B4C6-C98DA3205C09}" type="datetimeFigureOut">
               <a:rPr lang="en-US" smtClean="0"/>
               <a:pPr/>
-              <a:t>6/6/2017</a:t>
+              <a:t>6/13/2017</a:t>
             </a:fld>
             <a:endParaRPr lang="en-US"/>
           </a:p>
@@ -2675,7 +2675,7 @@
             <a:fld id="{1D8BD707-D9CF-40AE-B4C6-C98DA3205C09}" type="datetimeFigureOut">
               <a:rPr lang="en-US" smtClean="0"/>
               <a:pPr/>
-              <a:t>6/6/2017</a:t>
+              <a:t>6/13/2017</a:t>
             </a:fld>
             <a:endParaRPr lang="en-US"/>
           </a:p>
@@ -2924,7 +2924,7 @@
             <a:fld id="{1D8BD707-D9CF-40AE-B4C6-C98DA3205C09}" type="datetimeFigureOut">
               <a:rPr lang="en-US" smtClean="0"/>
               <a:pPr/>
-              <a:t>6/6/2017</a:t>
+              <a:t>6/13/2017</a:t>
             </a:fld>
             <a:endParaRPr lang="en-US"/>
           </a:p>
@@ -3132,7 +3132,7 @@
             <a:fld id="{1D8BD707-D9CF-40AE-B4C6-C98DA3205C09}" type="datetimeFigureOut">
               <a:rPr lang="en-US" smtClean="0"/>
               <a:pPr/>
-              <a:t>6/6/2017</a:t>
+              <a:t>6/13/2017</a:t>
             </a:fld>
             <a:endParaRPr lang="en-US"/>
           </a:p>
@@ -5463,7 +5463,7 @@
           <a:prstGeom prst="line">
             <a:avLst/>
           </a:prstGeom>
-          <a:ln w="28575">
+          <a:ln w="38100">
             <a:solidFill>
               <a:srgbClr val="F79646"/>
             </a:solidFill>
@@ -5500,7 +5500,7 @@
           <a:prstGeom prst="line">
             <a:avLst/>
           </a:prstGeom>
-          <a:ln w="28575">
+          <a:ln w="38100">
             <a:solidFill>
               <a:srgbClr val="F79646"/>
             </a:solidFill>
@@ -5535,7 +5535,7 @@
           <a:prstGeom prst="line">
             <a:avLst/>
           </a:prstGeom>
-          <a:ln w="28575">
+          <a:ln w="38100">
             <a:solidFill>
               <a:srgbClr val="F79646"/>
             </a:solidFill>

</xml_diff>

<commit_message>
Add new minimized icons
</commit_message>
<xml_diff>
--- a/doc/Icons-AnimationLab.pptx
+++ b/doc/Icons-AnimationLab.pptx
@@ -221,7 +221,7 @@
           <a:p>
             <a:fld id="{6699ACB9-486C-4D62-A3A7-AF98E13EFDA3}" type="datetimeFigureOut">
               <a:rPr lang="en-US" smtClean="0"/>
-              <a:t>6/13/2017</a:t>
+              <a:t>6/15/2017</a:t>
             </a:fld>
             <a:endParaRPr lang="en-US"/>
           </a:p>
@@ -752,7 +752,7 @@
             <a:fld id="{1D8BD707-D9CF-40AE-B4C6-C98DA3205C09}" type="datetimeFigureOut">
               <a:rPr lang="en-US" smtClean="0"/>
               <a:pPr/>
-              <a:t>6/13/2017</a:t>
+              <a:t>6/15/2017</a:t>
             </a:fld>
             <a:endParaRPr lang="en-US"/>
           </a:p>
@@ -917,7 +917,7 @@
             <a:fld id="{1D8BD707-D9CF-40AE-B4C6-C98DA3205C09}" type="datetimeFigureOut">
               <a:rPr lang="en-US" smtClean="0"/>
               <a:pPr/>
-              <a:t>6/13/2017</a:t>
+              <a:t>6/15/2017</a:t>
             </a:fld>
             <a:endParaRPr lang="en-US"/>
           </a:p>
@@ -1092,7 +1092,7 @@
             <a:fld id="{1D8BD707-D9CF-40AE-B4C6-C98DA3205C09}" type="datetimeFigureOut">
               <a:rPr lang="en-US" smtClean="0"/>
               <a:pPr/>
-              <a:t>6/13/2017</a:t>
+              <a:t>6/15/2017</a:t>
             </a:fld>
             <a:endParaRPr lang="en-US"/>
           </a:p>
@@ -1257,7 +1257,7 @@
             <a:fld id="{1D8BD707-D9CF-40AE-B4C6-C98DA3205C09}" type="datetimeFigureOut">
               <a:rPr lang="en-US" smtClean="0"/>
               <a:pPr/>
-              <a:t>6/13/2017</a:t>
+              <a:t>6/15/2017</a:t>
             </a:fld>
             <a:endParaRPr lang="en-US"/>
           </a:p>
@@ -1499,7 +1499,7 @@
             <a:fld id="{1D8BD707-D9CF-40AE-B4C6-C98DA3205C09}" type="datetimeFigureOut">
               <a:rPr lang="en-US" smtClean="0"/>
               <a:pPr/>
-              <a:t>6/13/2017</a:t>
+              <a:t>6/15/2017</a:t>
             </a:fld>
             <a:endParaRPr lang="en-US"/>
           </a:p>
@@ -1781,7 +1781,7 @@
             <a:fld id="{1D8BD707-D9CF-40AE-B4C6-C98DA3205C09}" type="datetimeFigureOut">
               <a:rPr lang="en-US" smtClean="0"/>
               <a:pPr/>
-              <a:t>6/13/2017</a:t>
+              <a:t>6/15/2017</a:t>
             </a:fld>
             <a:endParaRPr lang="en-US"/>
           </a:p>
@@ -2197,7 +2197,7 @@
             <a:fld id="{1D8BD707-D9CF-40AE-B4C6-C98DA3205C09}" type="datetimeFigureOut">
               <a:rPr lang="en-US" smtClean="0"/>
               <a:pPr/>
-              <a:t>6/13/2017</a:t>
+              <a:t>6/15/2017</a:t>
             </a:fld>
             <a:endParaRPr lang="en-US"/>
           </a:p>
@@ -2311,7 +2311,7 @@
             <a:fld id="{1D8BD707-D9CF-40AE-B4C6-C98DA3205C09}" type="datetimeFigureOut">
               <a:rPr lang="en-US" smtClean="0"/>
               <a:pPr/>
-              <a:t>6/13/2017</a:t>
+              <a:t>6/15/2017</a:t>
             </a:fld>
             <a:endParaRPr lang="en-US"/>
           </a:p>
@@ -2403,7 +2403,7 @@
             <a:fld id="{1D8BD707-D9CF-40AE-B4C6-C98DA3205C09}" type="datetimeFigureOut">
               <a:rPr lang="en-US" smtClean="0"/>
               <a:pPr/>
-              <a:t>6/13/2017</a:t>
+              <a:t>6/15/2017</a:t>
             </a:fld>
             <a:endParaRPr lang="en-US"/>
           </a:p>
@@ -2675,7 +2675,7 @@
             <a:fld id="{1D8BD707-D9CF-40AE-B4C6-C98DA3205C09}" type="datetimeFigureOut">
               <a:rPr lang="en-US" smtClean="0"/>
               <a:pPr/>
-              <a:t>6/13/2017</a:t>
+              <a:t>6/15/2017</a:t>
             </a:fld>
             <a:endParaRPr lang="en-US"/>
           </a:p>
@@ -2924,7 +2924,7 @@
             <a:fld id="{1D8BD707-D9CF-40AE-B4C6-C98DA3205C09}" type="datetimeFigureOut">
               <a:rPr lang="en-US" smtClean="0"/>
               <a:pPr/>
-              <a:t>6/13/2017</a:t>
+              <a:t>6/15/2017</a:t>
             </a:fld>
             <a:endParaRPr lang="en-US"/>
           </a:p>
@@ -3132,7 +3132,7 @@
             <a:fld id="{1D8BD707-D9CF-40AE-B4C6-C98DA3205C09}" type="datetimeFigureOut">
               <a:rPr lang="en-US" smtClean="0"/>
               <a:pPr/>
-              <a:t>6/13/2017</a:t>
+              <a:t>6/15/2017</a:t>
             </a:fld>
             <a:endParaRPr lang="en-US"/>
           </a:p>
@@ -5447,118 +5447,9 @@
           </a:p>
         </p:txBody>
       </p:sp>
-      <p:cxnSp>
-        <p:nvCxnSpPr>
-          <p:cNvPr id="11" name="Straight Connector 10"/>
-          <p:cNvCxnSpPr>
-            <a:cxnSpLocks/>
-          </p:cNvCxnSpPr>
-          <p:nvPr/>
-        </p:nvCxnSpPr>
-        <p:spPr>
-          <a:xfrm>
-            <a:off x="3939434" y="1725306"/>
-            <a:ext cx="353939" cy="0"/>
-          </a:xfrm>
-          <a:prstGeom prst="line">
-            <a:avLst/>
-          </a:prstGeom>
-          <a:ln w="38100">
-            <a:solidFill>
-              <a:srgbClr val="F79646"/>
-            </a:solidFill>
-          </a:ln>
-        </p:spPr>
-        <p:style>
-          <a:lnRef idx="1">
-            <a:schemeClr val="accent1"/>
-          </a:lnRef>
-          <a:fillRef idx="0">
-            <a:schemeClr val="accent1"/>
-          </a:fillRef>
-          <a:effectRef idx="0">
-            <a:schemeClr val="accent1"/>
-          </a:effectRef>
-          <a:fontRef idx="minor">
-            <a:schemeClr val="tx1"/>
-          </a:fontRef>
-        </p:style>
-      </p:cxnSp>
-      <p:cxnSp>
-        <p:nvCxnSpPr>
-          <p:cNvPr id="120" name="Straight Connector 119"/>
-          <p:cNvCxnSpPr>
-            <a:cxnSpLocks/>
-          </p:cNvCxnSpPr>
-          <p:nvPr/>
-        </p:nvCxnSpPr>
-        <p:spPr>
-          <a:xfrm>
-            <a:off x="3939434" y="1914469"/>
-            <a:ext cx="258808" cy="0"/>
-          </a:xfrm>
-          <a:prstGeom prst="line">
-            <a:avLst/>
-          </a:prstGeom>
-          <a:ln w="38100">
-            <a:solidFill>
-              <a:srgbClr val="F79646"/>
-            </a:solidFill>
-          </a:ln>
-        </p:spPr>
-        <p:style>
-          <a:lnRef idx="1">
-            <a:schemeClr val="accent1"/>
-          </a:lnRef>
-          <a:fillRef idx="0">
-            <a:schemeClr val="accent1"/>
-          </a:fillRef>
-          <a:effectRef idx="0">
-            <a:schemeClr val="accent1"/>
-          </a:effectRef>
-          <a:fontRef idx="minor">
-            <a:schemeClr val="tx1"/>
-          </a:fontRef>
-        </p:style>
-      </p:cxnSp>
-      <p:cxnSp>
-        <p:nvCxnSpPr>
-          <p:cNvPr id="121" name="Straight Connector 120"/>
-          <p:cNvCxnSpPr/>
-          <p:nvPr/>
-        </p:nvCxnSpPr>
-        <p:spPr>
-          <a:xfrm>
-            <a:off x="3939434" y="2102986"/>
-            <a:ext cx="258808" cy="0"/>
-          </a:xfrm>
-          <a:prstGeom prst="line">
-            <a:avLst/>
-          </a:prstGeom>
-          <a:ln w="38100">
-            <a:solidFill>
-              <a:srgbClr val="F79646"/>
-            </a:solidFill>
-          </a:ln>
-        </p:spPr>
-        <p:style>
-          <a:lnRef idx="1">
-            <a:schemeClr val="accent1"/>
-          </a:lnRef>
-          <a:fillRef idx="0">
-            <a:schemeClr val="accent1"/>
-          </a:fillRef>
-          <a:effectRef idx="0">
-            <a:schemeClr val="accent1"/>
-          </a:effectRef>
-          <a:fontRef idx="minor">
-            <a:schemeClr val="tx1"/>
-          </a:fontRef>
-        </p:style>
-      </p:cxnSp>
       <p:grpSp>
         <p:nvGrpSpPr>
-          <p:cNvPr id="115" name="Group 114"/>
+          <p:cNvPr id="2" name="Group 1"/>
           <p:cNvGrpSpPr/>
           <p:nvPr/>
         </p:nvGrpSpPr>
@@ -5566,120 +5457,290 @@
           <a:xfrm>
             <a:off x="3857848" y="1515362"/>
             <a:ext cx="838200" cy="838200"/>
-            <a:chOff x="1002575" y="1231726"/>
+            <a:chOff x="3857848" y="1515362"/>
             <a:chExt cx="838200" cy="838200"/>
           </a:xfrm>
         </p:grpSpPr>
+        <p:cxnSp>
+          <p:nvCxnSpPr>
+            <p:cNvPr id="11" name="Straight Connector 10"/>
+            <p:cNvCxnSpPr>
+              <a:cxnSpLocks/>
+            </p:cNvCxnSpPr>
+            <p:nvPr/>
+          </p:nvCxnSpPr>
+          <p:spPr>
+            <a:xfrm>
+              <a:off x="3939434" y="1725306"/>
+              <a:ext cx="353939" cy="0"/>
+            </a:xfrm>
+            <a:prstGeom prst="line">
+              <a:avLst/>
+            </a:prstGeom>
+            <a:ln w="38100">
+              <a:solidFill>
+                <a:srgbClr val="F79646"/>
+              </a:solidFill>
+            </a:ln>
+          </p:spPr>
+          <p:style>
+            <a:lnRef idx="1">
+              <a:schemeClr val="accent1"/>
+            </a:lnRef>
+            <a:fillRef idx="0">
+              <a:schemeClr val="accent1"/>
+            </a:fillRef>
+            <a:effectRef idx="0">
+              <a:schemeClr val="accent1"/>
+            </a:effectRef>
+            <a:fontRef idx="minor">
+              <a:schemeClr val="tx1"/>
+            </a:fontRef>
+          </p:style>
+        </p:cxnSp>
+        <p:cxnSp>
+          <p:nvCxnSpPr>
+            <p:cNvPr id="120" name="Straight Connector 119"/>
+            <p:cNvCxnSpPr>
+              <a:cxnSpLocks/>
+            </p:cNvCxnSpPr>
+            <p:nvPr/>
+          </p:nvCxnSpPr>
+          <p:spPr>
+            <a:xfrm>
+              <a:off x="3939434" y="1914469"/>
+              <a:ext cx="258808" cy="0"/>
+            </a:xfrm>
+            <a:prstGeom prst="line">
+              <a:avLst/>
+            </a:prstGeom>
+            <a:ln w="38100">
+              <a:solidFill>
+                <a:srgbClr val="F79646"/>
+              </a:solidFill>
+            </a:ln>
+          </p:spPr>
+          <p:style>
+            <a:lnRef idx="1">
+              <a:schemeClr val="accent1"/>
+            </a:lnRef>
+            <a:fillRef idx="0">
+              <a:schemeClr val="accent1"/>
+            </a:fillRef>
+            <a:effectRef idx="0">
+              <a:schemeClr val="accent1"/>
+            </a:effectRef>
+            <a:fontRef idx="minor">
+              <a:schemeClr val="tx1"/>
+            </a:fontRef>
+          </p:style>
+        </p:cxnSp>
+        <p:cxnSp>
+          <p:nvCxnSpPr>
+            <p:cNvPr id="121" name="Straight Connector 120"/>
+            <p:cNvCxnSpPr/>
+            <p:nvPr/>
+          </p:nvCxnSpPr>
+          <p:spPr>
+            <a:xfrm>
+              <a:off x="3939434" y="2102986"/>
+              <a:ext cx="258808" cy="0"/>
+            </a:xfrm>
+            <a:prstGeom prst="line">
+              <a:avLst/>
+            </a:prstGeom>
+            <a:ln w="38100">
+              <a:solidFill>
+                <a:srgbClr val="F79646"/>
+              </a:solidFill>
+            </a:ln>
+          </p:spPr>
+          <p:style>
+            <a:lnRef idx="1">
+              <a:schemeClr val="accent1"/>
+            </a:lnRef>
+            <a:fillRef idx="0">
+              <a:schemeClr val="accent1"/>
+            </a:fillRef>
+            <a:effectRef idx="0">
+              <a:schemeClr val="accent1"/>
+            </a:effectRef>
+            <a:fontRef idx="minor">
+              <a:schemeClr val="tx1"/>
+            </a:fontRef>
+          </p:style>
+        </p:cxnSp>
+        <p:grpSp>
+          <p:nvGrpSpPr>
+            <p:cNvPr id="115" name="Group 114"/>
+            <p:cNvGrpSpPr/>
+            <p:nvPr/>
+          </p:nvGrpSpPr>
+          <p:grpSpPr>
+            <a:xfrm>
+              <a:off x="3857848" y="1515362"/>
+              <a:ext cx="838200" cy="838200"/>
+              <a:chOff x="1002575" y="1231726"/>
+              <a:chExt cx="838200" cy="838200"/>
+            </a:xfrm>
+          </p:grpSpPr>
+          <p:sp>
+            <p:nvSpPr>
+              <p:cNvPr id="117" name="Rectangle 116"/>
+              <p:cNvSpPr/>
+              <p:nvPr/>
+            </p:nvSpPr>
+            <p:spPr>
+              <a:xfrm>
+                <a:off x="1002575" y="1231726"/>
+                <a:ext cx="838200" cy="838200"/>
+              </a:xfrm>
+              <a:prstGeom prst="rect">
+                <a:avLst/>
+              </a:prstGeom>
+              <a:noFill/>
+              <a:ln>
+                <a:noFill/>
+              </a:ln>
+            </p:spPr>
+            <p:style>
+              <a:lnRef idx="2">
+                <a:schemeClr val="accent1">
+                  <a:shade val="50000"/>
+                </a:schemeClr>
+              </a:lnRef>
+              <a:fillRef idx="1">
+                <a:schemeClr val="accent1"/>
+              </a:fillRef>
+              <a:effectRef idx="0">
+                <a:schemeClr val="accent1"/>
+              </a:effectRef>
+              <a:fontRef idx="minor">
+                <a:schemeClr val="lt1"/>
+              </a:fontRef>
+            </p:style>
+            <p:txBody>
+              <a:bodyPr rtlCol="0" anchor="ctr"/>
+              <a:lstStyle/>
+              <a:p>
+                <a:pPr algn="ctr"/>
+                <a:endParaRPr lang="en-SG"/>
+              </a:p>
+            </p:txBody>
+          </p:sp>
+          <p:sp>
+            <p:nvSpPr>
+              <p:cNvPr id="118" name="Rectangle 4"/>
+              <p:cNvSpPr/>
+              <p:nvPr/>
+            </p:nvSpPr>
+            <p:spPr>
+              <a:xfrm rot="16200000">
+                <a:off x="1071530" y="1304929"/>
+                <a:ext cx="700291" cy="690781"/>
+              </a:xfrm>
+              <a:custGeom>
+                <a:avLst/>
+                <a:gdLst/>
+                <a:ahLst/>
+                <a:cxnLst/>
+                <a:rect l="l" t="t" r="r" b="b"/>
+                <a:pathLst>
+                  <a:path w="1752603" h="1752600">
+                    <a:moveTo>
+                      <a:pt x="533400" y="0"/>
+                    </a:moveTo>
+                    <a:lnTo>
+                      <a:pt x="533403" y="0"/>
+                    </a:lnTo>
+                    <a:lnTo>
+                      <a:pt x="1066800" y="0"/>
+                    </a:lnTo>
+                    <a:lnTo>
+                      <a:pt x="1752603" y="0"/>
+                    </a:lnTo>
+                    <a:lnTo>
+                      <a:pt x="1752603" y="1752600"/>
+                    </a:lnTo>
+                    <a:lnTo>
+                      <a:pt x="1219203" y="1752600"/>
+                    </a:lnTo>
+                    <a:lnTo>
+                      <a:pt x="533403" y="1752600"/>
+                    </a:lnTo>
+                    <a:lnTo>
+                      <a:pt x="3" y="1752600"/>
+                    </a:lnTo>
+                    <a:lnTo>
+                      <a:pt x="3" y="533430"/>
+                    </a:lnTo>
+                    <a:cubicBezTo>
+                      <a:pt x="0" y="533420"/>
+                      <a:pt x="0" y="533410"/>
+                      <a:pt x="0" y="533400"/>
+                    </a:cubicBezTo>
+                    <a:cubicBezTo>
+                      <a:pt x="0" y="238811"/>
+                      <a:pt x="238811" y="0"/>
+                      <a:pt x="533400" y="0"/>
+                    </a:cubicBezTo>
+                    <a:close/>
+                  </a:path>
+                </a:pathLst>
+              </a:custGeom>
+              <a:noFill/>
+              <a:ln w="76200" cmpd="sng">
+                <a:solidFill>
+                  <a:srgbClr val="0070C0"/>
+                </a:solidFill>
+                <a:miter lim="800000"/>
+              </a:ln>
+            </p:spPr>
+            <p:style>
+              <a:lnRef idx="2">
+                <a:schemeClr val="accent1">
+                  <a:shade val="50000"/>
+                </a:schemeClr>
+              </a:lnRef>
+              <a:fillRef idx="1">
+                <a:schemeClr val="accent1"/>
+              </a:fillRef>
+              <a:effectRef idx="0">
+                <a:schemeClr val="accent1"/>
+              </a:effectRef>
+              <a:fontRef idx="minor">
+                <a:schemeClr val="lt1"/>
+              </a:fontRef>
+            </p:style>
+            <p:txBody>
+              <a:bodyPr rtlCol="0" anchor="ctr"/>
+              <a:lstStyle/>
+              <a:p>
+                <a:pPr algn="ctr"/>
+                <a:endParaRPr lang="en-US"/>
+              </a:p>
+            </p:txBody>
+          </p:sp>
+        </p:grpSp>
         <p:sp>
           <p:nvSpPr>
-            <p:cNvPr id="117" name="Rectangle 116"/>
+            <p:cNvPr id="119" name="Star: 5 Points 118"/>
             <p:cNvSpPr/>
             <p:nvPr/>
           </p:nvSpPr>
           <p:spPr>
             <a:xfrm>
-              <a:off x="1002575" y="1231726"/>
-              <a:ext cx="838200" cy="838200"/>
+              <a:off x="4050476" y="1662781"/>
+              <a:ext cx="527875" cy="503377"/>
             </a:xfrm>
-            <a:prstGeom prst="rect">
+            <a:prstGeom prst="star5">
               <a:avLst/>
             </a:prstGeom>
-            <a:noFill/>
+            <a:solidFill>
+              <a:srgbClr val="0070C0"/>
+            </a:solidFill>
             <a:ln>
               <a:noFill/>
-            </a:ln>
-          </p:spPr>
-          <p:style>
-            <a:lnRef idx="2">
-              <a:schemeClr val="accent1">
-                <a:shade val="50000"/>
-              </a:schemeClr>
-            </a:lnRef>
-            <a:fillRef idx="1">
-              <a:schemeClr val="accent1"/>
-            </a:fillRef>
-            <a:effectRef idx="0">
-              <a:schemeClr val="accent1"/>
-            </a:effectRef>
-            <a:fontRef idx="minor">
-              <a:schemeClr val="lt1"/>
-            </a:fontRef>
-          </p:style>
-          <p:txBody>
-            <a:bodyPr rtlCol="0" anchor="ctr"/>
-            <a:lstStyle/>
-            <a:p>
-              <a:pPr algn="ctr"/>
-              <a:endParaRPr lang="en-SG"/>
-            </a:p>
-          </p:txBody>
-        </p:sp>
-        <p:sp>
-          <p:nvSpPr>
-            <p:cNvPr id="118" name="Rectangle 4"/>
-            <p:cNvSpPr/>
-            <p:nvPr/>
-          </p:nvSpPr>
-          <p:spPr>
-            <a:xfrm rot="16200000">
-              <a:off x="1071530" y="1304929"/>
-              <a:ext cx="700291" cy="690781"/>
-            </a:xfrm>
-            <a:custGeom>
-              <a:avLst/>
-              <a:gdLst/>
-              <a:ahLst/>
-              <a:cxnLst/>
-              <a:rect l="l" t="t" r="r" b="b"/>
-              <a:pathLst>
-                <a:path w="1752603" h="1752600">
-                  <a:moveTo>
-                    <a:pt x="533400" y="0"/>
-                  </a:moveTo>
-                  <a:lnTo>
-                    <a:pt x="533403" y="0"/>
-                  </a:lnTo>
-                  <a:lnTo>
-                    <a:pt x="1066800" y="0"/>
-                  </a:lnTo>
-                  <a:lnTo>
-                    <a:pt x="1752603" y="0"/>
-                  </a:lnTo>
-                  <a:lnTo>
-                    <a:pt x="1752603" y="1752600"/>
-                  </a:lnTo>
-                  <a:lnTo>
-                    <a:pt x="1219203" y="1752600"/>
-                  </a:lnTo>
-                  <a:lnTo>
-                    <a:pt x="533403" y="1752600"/>
-                  </a:lnTo>
-                  <a:lnTo>
-                    <a:pt x="3" y="1752600"/>
-                  </a:lnTo>
-                  <a:lnTo>
-                    <a:pt x="3" y="533430"/>
-                  </a:lnTo>
-                  <a:cubicBezTo>
-                    <a:pt x="0" y="533420"/>
-                    <a:pt x="0" y="533410"/>
-                    <a:pt x="0" y="533400"/>
-                  </a:cubicBezTo>
-                  <a:cubicBezTo>
-                    <a:pt x="0" y="238811"/>
-                    <a:pt x="238811" y="0"/>
-                    <a:pt x="533400" y="0"/>
-                  </a:cubicBezTo>
-                  <a:close/>
-                </a:path>
-              </a:pathLst>
-            </a:custGeom>
-            <a:noFill/>
-            <a:ln w="76200" cmpd="sng">
-              <a:solidFill>
-                <a:srgbClr val="0070C0"/>
-              </a:solidFill>
-              <a:miter lim="800000"/>
             </a:ln>
           </p:spPr>
           <p:style>
@@ -5708,52 +5769,6 @@
           </p:txBody>
         </p:sp>
       </p:grpSp>
-      <p:sp>
-        <p:nvSpPr>
-          <p:cNvPr id="119" name="Star: 5 Points 118"/>
-          <p:cNvSpPr/>
-          <p:nvPr/>
-        </p:nvSpPr>
-        <p:spPr>
-          <a:xfrm>
-            <a:off x="4050476" y="1662781"/>
-            <a:ext cx="527875" cy="503377"/>
-          </a:xfrm>
-          <a:prstGeom prst="star5">
-            <a:avLst/>
-          </a:prstGeom>
-          <a:solidFill>
-            <a:srgbClr val="0070C0"/>
-          </a:solidFill>
-          <a:ln>
-            <a:noFill/>
-          </a:ln>
-        </p:spPr>
-        <p:style>
-          <a:lnRef idx="2">
-            <a:schemeClr val="accent1">
-              <a:shade val="50000"/>
-            </a:schemeClr>
-          </a:lnRef>
-          <a:fillRef idx="1">
-            <a:schemeClr val="accent1"/>
-          </a:fillRef>
-          <a:effectRef idx="0">
-            <a:schemeClr val="accent1"/>
-          </a:effectRef>
-          <a:fontRef idx="minor">
-            <a:schemeClr val="lt1"/>
-          </a:fontRef>
-        </p:style>
-        <p:txBody>
-          <a:bodyPr rtlCol="0" anchor="ctr"/>
-          <a:lstStyle/>
-          <a:p>
-            <a:pPr algn="ctr"/>
-            <a:endParaRPr lang="en-US"/>
-          </a:p>
-        </p:txBody>
-      </p:sp>
       <p:cxnSp>
         <p:nvCxnSpPr>
           <p:cNvPr id="122" name="Straight Connector 121"/>
@@ -6989,6 +7004,220 @@
           </a:p>
         </p:txBody>
       </p:sp>
+      <p:grpSp>
+        <p:nvGrpSpPr>
+          <p:cNvPr id="136" name="Group 135"/>
+          <p:cNvGrpSpPr/>
+          <p:nvPr/>
+        </p:nvGrpSpPr>
+        <p:grpSpPr>
+          <a:xfrm>
+            <a:off x="519636" y="2642105"/>
+            <a:ext cx="838200" cy="838200"/>
+            <a:chOff x="3857848" y="1515362"/>
+            <a:chExt cx="838200" cy="838200"/>
+          </a:xfrm>
+        </p:grpSpPr>
+        <p:cxnSp>
+          <p:nvCxnSpPr>
+            <p:cNvPr id="137" name="Straight Connector 136"/>
+            <p:cNvCxnSpPr>
+              <a:cxnSpLocks/>
+            </p:cNvCxnSpPr>
+            <p:nvPr/>
+          </p:nvCxnSpPr>
+          <p:spPr>
+            <a:xfrm>
+              <a:off x="3939434" y="1725306"/>
+              <a:ext cx="353939" cy="0"/>
+            </a:xfrm>
+            <a:prstGeom prst="line">
+              <a:avLst/>
+            </a:prstGeom>
+            <a:ln w="38100">
+              <a:solidFill>
+                <a:srgbClr val="F79646"/>
+              </a:solidFill>
+            </a:ln>
+          </p:spPr>
+          <p:style>
+            <a:lnRef idx="1">
+              <a:schemeClr val="accent1"/>
+            </a:lnRef>
+            <a:fillRef idx="0">
+              <a:schemeClr val="accent1"/>
+            </a:fillRef>
+            <a:effectRef idx="0">
+              <a:schemeClr val="accent1"/>
+            </a:effectRef>
+            <a:fontRef idx="minor">
+              <a:schemeClr val="tx1"/>
+            </a:fontRef>
+          </p:style>
+        </p:cxnSp>
+        <p:cxnSp>
+          <p:nvCxnSpPr>
+            <p:cNvPr id="138" name="Straight Connector 137"/>
+            <p:cNvCxnSpPr>
+              <a:cxnSpLocks/>
+            </p:cNvCxnSpPr>
+            <p:nvPr/>
+          </p:nvCxnSpPr>
+          <p:spPr>
+            <a:xfrm>
+              <a:off x="3939434" y="1914469"/>
+              <a:ext cx="258808" cy="0"/>
+            </a:xfrm>
+            <a:prstGeom prst="line">
+              <a:avLst/>
+            </a:prstGeom>
+            <a:ln w="38100">
+              <a:solidFill>
+                <a:srgbClr val="F79646"/>
+              </a:solidFill>
+            </a:ln>
+          </p:spPr>
+          <p:style>
+            <a:lnRef idx="1">
+              <a:schemeClr val="accent1"/>
+            </a:lnRef>
+            <a:fillRef idx="0">
+              <a:schemeClr val="accent1"/>
+            </a:fillRef>
+            <a:effectRef idx="0">
+              <a:schemeClr val="accent1"/>
+            </a:effectRef>
+            <a:fontRef idx="minor">
+              <a:schemeClr val="tx1"/>
+            </a:fontRef>
+          </p:style>
+        </p:cxnSp>
+        <p:cxnSp>
+          <p:nvCxnSpPr>
+            <p:cNvPr id="139" name="Straight Connector 138"/>
+            <p:cNvCxnSpPr/>
+            <p:nvPr/>
+          </p:nvCxnSpPr>
+          <p:spPr>
+            <a:xfrm>
+              <a:off x="3939434" y="2102986"/>
+              <a:ext cx="258808" cy="0"/>
+            </a:xfrm>
+            <a:prstGeom prst="line">
+              <a:avLst/>
+            </a:prstGeom>
+            <a:ln w="38100">
+              <a:solidFill>
+                <a:srgbClr val="F79646"/>
+              </a:solidFill>
+            </a:ln>
+          </p:spPr>
+          <p:style>
+            <a:lnRef idx="1">
+              <a:schemeClr val="accent1"/>
+            </a:lnRef>
+            <a:fillRef idx="0">
+              <a:schemeClr val="accent1"/>
+            </a:fillRef>
+            <a:effectRef idx="0">
+              <a:schemeClr val="accent1"/>
+            </a:effectRef>
+            <a:fontRef idx="minor">
+              <a:schemeClr val="tx1"/>
+            </a:fontRef>
+          </p:style>
+        </p:cxnSp>
+        <p:sp>
+          <p:nvSpPr>
+            <p:cNvPr id="142" name="Rectangle 141"/>
+            <p:cNvSpPr/>
+            <p:nvPr/>
+          </p:nvSpPr>
+          <p:spPr>
+            <a:xfrm>
+              <a:off x="3857848" y="1515362"/>
+              <a:ext cx="838200" cy="838200"/>
+            </a:xfrm>
+            <a:prstGeom prst="rect">
+              <a:avLst/>
+            </a:prstGeom>
+            <a:noFill/>
+            <a:ln>
+              <a:noFill/>
+            </a:ln>
+          </p:spPr>
+          <p:style>
+            <a:lnRef idx="2">
+              <a:schemeClr val="accent1">
+                <a:shade val="50000"/>
+              </a:schemeClr>
+            </a:lnRef>
+            <a:fillRef idx="1">
+              <a:schemeClr val="accent1"/>
+            </a:fillRef>
+            <a:effectRef idx="0">
+              <a:schemeClr val="accent1"/>
+            </a:effectRef>
+            <a:fontRef idx="minor">
+              <a:schemeClr val="lt1"/>
+            </a:fontRef>
+          </p:style>
+          <p:txBody>
+            <a:bodyPr rtlCol="0" anchor="ctr"/>
+            <a:lstStyle/>
+            <a:p>
+              <a:pPr algn="ctr"/>
+              <a:endParaRPr lang="en-SG"/>
+            </a:p>
+          </p:txBody>
+        </p:sp>
+        <p:sp>
+          <p:nvSpPr>
+            <p:cNvPr id="141" name="Star: 5 Points 140"/>
+            <p:cNvSpPr/>
+            <p:nvPr/>
+          </p:nvSpPr>
+          <p:spPr>
+            <a:xfrm>
+              <a:off x="4050476" y="1662781"/>
+              <a:ext cx="527875" cy="503377"/>
+            </a:xfrm>
+            <a:prstGeom prst="star5">
+              <a:avLst/>
+            </a:prstGeom>
+            <a:solidFill>
+              <a:srgbClr val="0070C0"/>
+            </a:solidFill>
+            <a:ln>
+              <a:noFill/>
+            </a:ln>
+          </p:spPr>
+          <p:style>
+            <a:lnRef idx="2">
+              <a:schemeClr val="accent1">
+                <a:shade val="50000"/>
+              </a:schemeClr>
+            </a:lnRef>
+            <a:fillRef idx="1">
+              <a:schemeClr val="accent1"/>
+            </a:fillRef>
+            <a:effectRef idx="0">
+              <a:schemeClr val="accent1"/>
+            </a:effectRef>
+            <a:fontRef idx="minor">
+              <a:schemeClr val="lt1"/>
+            </a:fontRef>
+          </p:style>
+          <p:txBody>
+            <a:bodyPr rtlCol="0" anchor="ctr"/>
+            <a:lstStyle/>
+            <a:p>
+              <a:pPr algn="ctr"/>
+              <a:endParaRPr lang="en-US"/>
+            </a:p>
+          </p:txBody>
+        </p:sp>
+      </p:grpSp>
     </p:spTree>
     <p:extLst>
       <p:ext uri="{BB962C8B-B14F-4D97-AF65-F5344CB8AC3E}">

</xml_diff>

<commit_message>
Minimized icons for Ribbon #1458 (#1462)
* Add new minimized icons
</commit_message>
<xml_diff>
--- a/doc/Icons-AnimationLab.pptx
+++ b/doc/Icons-AnimationLab.pptx
@@ -221,7 +221,7 @@
           <a:p>
             <a:fld id="{6699ACB9-486C-4D62-A3A7-AF98E13EFDA3}" type="datetimeFigureOut">
               <a:rPr lang="en-US" smtClean="0"/>
-              <a:t>6/13/2017</a:t>
+              <a:t>6/15/2017</a:t>
             </a:fld>
             <a:endParaRPr lang="en-US"/>
           </a:p>
@@ -752,7 +752,7 @@
             <a:fld id="{1D8BD707-D9CF-40AE-B4C6-C98DA3205C09}" type="datetimeFigureOut">
               <a:rPr lang="en-US" smtClean="0"/>
               <a:pPr/>
-              <a:t>6/13/2017</a:t>
+              <a:t>6/15/2017</a:t>
             </a:fld>
             <a:endParaRPr lang="en-US"/>
           </a:p>
@@ -917,7 +917,7 @@
             <a:fld id="{1D8BD707-D9CF-40AE-B4C6-C98DA3205C09}" type="datetimeFigureOut">
               <a:rPr lang="en-US" smtClean="0"/>
               <a:pPr/>
-              <a:t>6/13/2017</a:t>
+              <a:t>6/15/2017</a:t>
             </a:fld>
             <a:endParaRPr lang="en-US"/>
           </a:p>
@@ -1092,7 +1092,7 @@
             <a:fld id="{1D8BD707-D9CF-40AE-B4C6-C98DA3205C09}" type="datetimeFigureOut">
               <a:rPr lang="en-US" smtClean="0"/>
               <a:pPr/>
-              <a:t>6/13/2017</a:t>
+              <a:t>6/15/2017</a:t>
             </a:fld>
             <a:endParaRPr lang="en-US"/>
           </a:p>
@@ -1257,7 +1257,7 @@
             <a:fld id="{1D8BD707-D9CF-40AE-B4C6-C98DA3205C09}" type="datetimeFigureOut">
               <a:rPr lang="en-US" smtClean="0"/>
               <a:pPr/>
-              <a:t>6/13/2017</a:t>
+              <a:t>6/15/2017</a:t>
             </a:fld>
             <a:endParaRPr lang="en-US"/>
           </a:p>
@@ -1499,7 +1499,7 @@
             <a:fld id="{1D8BD707-D9CF-40AE-B4C6-C98DA3205C09}" type="datetimeFigureOut">
               <a:rPr lang="en-US" smtClean="0"/>
               <a:pPr/>
-              <a:t>6/13/2017</a:t>
+              <a:t>6/15/2017</a:t>
             </a:fld>
             <a:endParaRPr lang="en-US"/>
           </a:p>
@@ -1781,7 +1781,7 @@
             <a:fld id="{1D8BD707-D9CF-40AE-B4C6-C98DA3205C09}" type="datetimeFigureOut">
               <a:rPr lang="en-US" smtClean="0"/>
               <a:pPr/>
-              <a:t>6/13/2017</a:t>
+              <a:t>6/15/2017</a:t>
             </a:fld>
             <a:endParaRPr lang="en-US"/>
           </a:p>
@@ -2197,7 +2197,7 @@
             <a:fld id="{1D8BD707-D9CF-40AE-B4C6-C98DA3205C09}" type="datetimeFigureOut">
               <a:rPr lang="en-US" smtClean="0"/>
               <a:pPr/>
-              <a:t>6/13/2017</a:t>
+              <a:t>6/15/2017</a:t>
             </a:fld>
             <a:endParaRPr lang="en-US"/>
           </a:p>
@@ -2311,7 +2311,7 @@
             <a:fld id="{1D8BD707-D9CF-40AE-B4C6-C98DA3205C09}" type="datetimeFigureOut">
               <a:rPr lang="en-US" smtClean="0"/>
               <a:pPr/>
-              <a:t>6/13/2017</a:t>
+              <a:t>6/15/2017</a:t>
             </a:fld>
             <a:endParaRPr lang="en-US"/>
           </a:p>
@@ -2403,7 +2403,7 @@
             <a:fld id="{1D8BD707-D9CF-40AE-B4C6-C98DA3205C09}" type="datetimeFigureOut">
               <a:rPr lang="en-US" smtClean="0"/>
               <a:pPr/>
-              <a:t>6/13/2017</a:t>
+              <a:t>6/15/2017</a:t>
             </a:fld>
             <a:endParaRPr lang="en-US"/>
           </a:p>
@@ -2675,7 +2675,7 @@
             <a:fld id="{1D8BD707-D9CF-40AE-B4C6-C98DA3205C09}" type="datetimeFigureOut">
               <a:rPr lang="en-US" smtClean="0"/>
               <a:pPr/>
-              <a:t>6/13/2017</a:t>
+              <a:t>6/15/2017</a:t>
             </a:fld>
             <a:endParaRPr lang="en-US"/>
           </a:p>
@@ -2924,7 +2924,7 @@
             <a:fld id="{1D8BD707-D9CF-40AE-B4C6-C98DA3205C09}" type="datetimeFigureOut">
               <a:rPr lang="en-US" smtClean="0"/>
               <a:pPr/>
-              <a:t>6/13/2017</a:t>
+              <a:t>6/15/2017</a:t>
             </a:fld>
             <a:endParaRPr lang="en-US"/>
           </a:p>
@@ -3132,7 +3132,7 @@
             <a:fld id="{1D8BD707-D9CF-40AE-B4C6-C98DA3205C09}" type="datetimeFigureOut">
               <a:rPr lang="en-US" smtClean="0"/>
               <a:pPr/>
-              <a:t>6/13/2017</a:t>
+              <a:t>6/15/2017</a:t>
             </a:fld>
             <a:endParaRPr lang="en-US"/>
           </a:p>
@@ -5447,118 +5447,9 @@
           </a:p>
         </p:txBody>
       </p:sp>
-      <p:cxnSp>
-        <p:nvCxnSpPr>
-          <p:cNvPr id="11" name="Straight Connector 10"/>
-          <p:cNvCxnSpPr>
-            <a:cxnSpLocks/>
-          </p:cNvCxnSpPr>
-          <p:nvPr/>
-        </p:nvCxnSpPr>
-        <p:spPr>
-          <a:xfrm>
-            <a:off x="3939434" y="1725306"/>
-            <a:ext cx="353939" cy="0"/>
-          </a:xfrm>
-          <a:prstGeom prst="line">
-            <a:avLst/>
-          </a:prstGeom>
-          <a:ln w="38100">
-            <a:solidFill>
-              <a:srgbClr val="F79646"/>
-            </a:solidFill>
-          </a:ln>
-        </p:spPr>
-        <p:style>
-          <a:lnRef idx="1">
-            <a:schemeClr val="accent1"/>
-          </a:lnRef>
-          <a:fillRef idx="0">
-            <a:schemeClr val="accent1"/>
-          </a:fillRef>
-          <a:effectRef idx="0">
-            <a:schemeClr val="accent1"/>
-          </a:effectRef>
-          <a:fontRef idx="minor">
-            <a:schemeClr val="tx1"/>
-          </a:fontRef>
-        </p:style>
-      </p:cxnSp>
-      <p:cxnSp>
-        <p:nvCxnSpPr>
-          <p:cNvPr id="120" name="Straight Connector 119"/>
-          <p:cNvCxnSpPr>
-            <a:cxnSpLocks/>
-          </p:cNvCxnSpPr>
-          <p:nvPr/>
-        </p:nvCxnSpPr>
-        <p:spPr>
-          <a:xfrm>
-            <a:off x="3939434" y="1914469"/>
-            <a:ext cx="258808" cy="0"/>
-          </a:xfrm>
-          <a:prstGeom prst="line">
-            <a:avLst/>
-          </a:prstGeom>
-          <a:ln w="38100">
-            <a:solidFill>
-              <a:srgbClr val="F79646"/>
-            </a:solidFill>
-          </a:ln>
-        </p:spPr>
-        <p:style>
-          <a:lnRef idx="1">
-            <a:schemeClr val="accent1"/>
-          </a:lnRef>
-          <a:fillRef idx="0">
-            <a:schemeClr val="accent1"/>
-          </a:fillRef>
-          <a:effectRef idx="0">
-            <a:schemeClr val="accent1"/>
-          </a:effectRef>
-          <a:fontRef idx="minor">
-            <a:schemeClr val="tx1"/>
-          </a:fontRef>
-        </p:style>
-      </p:cxnSp>
-      <p:cxnSp>
-        <p:nvCxnSpPr>
-          <p:cNvPr id="121" name="Straight Connector 120"/>
-          <p:cNvCxnSpPr/>
-          <p:nvPr/>
-        </p:nvCxnSpPr>
-        <p:spPr>
-          <a:xfrm>
-            <a:off x="3939434" y="2102986"/>
-            <a:ext cx="258808" cy="0"/>
-          </a:xfrm>
-          <a:prstGeom prst="line">
-            <a:avLst/>
-          </a:prstGeom>
-          <a:ln w="38100">
-            <a:solidFill>
-              <a:srgbClr val="F79646"/>
-            </a:solidFill>
-          </a:ln>
-        </p:spPr>
-        <p:style>
-          <a:lnRef idx="1">
-            <a:schemeClr val="accent1"/>
-          </a:lnRef>
-          <a:fillRef idx="0">
-            <a:schemeClr val="accent1"/>
-          </a:fillRef>
-          <a:effectRef idx="0">
-            <a:schemeClr val="accent1"/>
-          </a:effectRef>
-          <a:fontRef idx="minor">
-            <a:schemeClr val="tx1"/>
-          </a:fontRef>
-        </p:style>
-      </p:cxnSp>
       <p:grpSp>
         <p:nvGrpSpPr>
-          <p:cNvPr id="115" name="Group 114"/>
+          <p:cNvPr id="2" name="Group 1"/>
           <p:cNvGrpSpPr/>
           <p:nvPr/>
         </p:nvGrpSpPr>
@@ -5566,120 +5457,290 @@
           <a:xfrm>
             <a:off x="3857848" y="1515362"/>
             <a:ext cx="838200" cy="838200"/>
-            <a:chOff x="1002575" y="1231726"/>
+            <a:chOff x="3857848" y="1515362"/>
             <a:chExt cx="838200" cy="838200"/>
           </a:xfrm>
         </p:grpSpPr>
+        <p:cxnSp>
+          <p:nvCxnSpPr>
+            <p:cNvPr id="11" name="Straight Connector 10"/>
+            <p:cNvCxnSpPr>
+              <a:cxnSpLocks/>
+            </p:cNvCxnSpPr>
+            <p:nvPr/>
+          </p:nvCxnSpPr>
+          <p:spPr>
+            <a:xfrm>
+              <a:off x="3939434" y="1725306"/>
+              <a:ext cx="353939" cy="0"/>
+            </a:xfrm>
+            <a:prstGeom prst="line">
+              <a:avLst/>
+            </a:prstGeom>
+            <a:ln w="38100">
+              <a:solidFill>
+                <a:srgbClr val="F79646"/>
+              </a:solidFill>
+            </a:ln>
+          </p:spPr>
+          <p:style>
+            <a:lnRef idx="1">
+              <a:schemeClr val="accent1"/>
+            </a:lnRef>
+            <a:fillRef idx="0">
+              <a:schemeClr val="accent1"/>
+            </a:fillRef>
+            <a:effectRef idx="0">
+              <a:schemeClr val="accent1"/>
+            </a:effectRef>
+            <a:fontRef idx="minor">
+              <a:schemeClr val="tx1"/>
+            </a:fontRef>
+          </p:style>
+        </p:cxnSp>
+        <p:cxnSp>
+          <p:nvCxnSpPr>
+            <p:cNvPr id="120" name="Straight Connector 119"/>
+            <p:cNvCxnSpPr>
+              <a:cxnSpLocks/>
+            </p:cNvCxnSpPr>
+            <p:nvPr/>
+          </p:nvCxnSpPr>
+          <p:spPr>
+            <a:xfrm>
+              <a:off x="3939434" y="1914469"/>
+              <a:ext cx="258808" cy="0"/>
+            </a:xfrm>
+            <a:prstGeom prst="line">
+              <a:avLst/>
+            </a:prstGeom>
+            <a:ln w="38100">
+              <a:solidFill>
+                <a:srgbClr val="F79646"/>
+              </a:solidFill>
+            </a:ln>
+          </p:spPr>
+          <p:style>
+            <a:lnRef idx="1">
+              <a:schemeClr val="accent1"/>
+            </a:lnRef>
+            <a:fillRef idx="0">
+              <a:schemeClr val="accent1"/>
+            </a:fillRef>
+            <a:effectRef idx="0">
+              <a:schemeClr val="accent1"/>
+            </a:effectRef>
+            <a:fontRef idx="minor">
+              <a:schemeClr val="tx1"/>
+            </a:fontRef>
+          </p:style>
+        </p:cxnSp>
+        <p:cxnSp>
+          <p:nvCxnSpPr>
+            <p:cNvPr id="121" name="Straight Connector 120"/>
+            <p:cNvCxnSpPr/>
+            <p:nvPr/>
+          </p:nvCxnSpPr>
+          <p:spPr>
+            <a:xfrm>
+              <a:off x="3939434" y="2102986"/>
+              <a:ext cx="258808" cy="0"/>
+            </a:xfrm>
+            <a:prstGeom prst="line">
+              <a:avLst/>
+            </a:prstGeom>
+            <a:ln w="38100">
+              <a:solidFill>
+                <a:srgbClr val="F79646"/>
+              </a:solidFill>
+            </a:ln>
+          </p:spPr>
+          <p:style>
+            <a:lnRef idx="1">
+              <a:schemeClr val="accent1"/>
+            </a:lnRef>
+            <a:fillRef idx="0">
+              <a:schemeClr val="accent1"/>
+            </a:fillRef>
+            <a:effectRef idx="0">
+              <a:schemeClr val="accent1"/>
+            </a:effectRef>
+            <a:fontRef idx="minor">
+              <a:schemeClr val="tx1"/>
+            </a:fontRef>
+          </p:style>
+        </p:cxnSp>
+        <p:grpSp>
+          <p:nvGrpSpPr>
+            <p:cNvPr id="115" name="Group 114"/>
+            <p:cNvGrpSpPr/>
+            <p:nvPr/>
+          </p:nvGrpSpPr>
+          <p:grpSpPr>
+            <a:xfrm>
+              <a:off x="3857848" y="1515362"/>
+              <a:ext cx="838200" cy="838200"/>
+              <a:chOff x="1002575" y="1231726"/>
+              <a:chExt cx="838200" cy="838200"/>
+            </a:xfrm>
+          </p:grpSpPr>
+          <p:sp>
+            <p:nvSpPr>
+              <p:cNvPr id="117" name="Rectangle 116"/>
+              <p:cNvSpPr/>
+              <p:nvPr/>
+            </p:nvSpPr>
+            <p:spPr>
+              <a:xfrm>
+                <a:off x="1002575" y="1231726"/>
+                <a:ext cx="838200" cy="838200"/>
+              </a:xfrm>
+              <a:prstGeom prst="rect">
+                <a:avLst/>
+              </a:prstGeom>
+              <a:noFill/>
+              <a:ln>
+                <a:noFill/>
+              </a:ln>
+            </p:spPr>
+            <p:style>
+              <a:lnRef idx="2">
+                <a:schemeClr val="accent1">
+                  <a:shade val="50000"/>
+                </a:schemeClr>
+              </a:lnRef>
+              <a:fillRef idx="1">
+                <a:schemeClr val="accent1"/>
+              </a:fillRef>
+              <a:effectRef idx="0">
+                <a:schemeClr val="accent1"/>
+              </a:effectRef>
+              <a:fontRef idx="minor">
+                <a:schemeClr val="lt1"/>
+              </a:fontRef>
+            </p:style>
+            <p:txBody>
+              <a:bodyPr rtlCol="0" anchor="ctr"/>
+              <a:lstStyle/>
+              <a:p>
+                <a:pPr algn="ctr"/>
+                <a:endParaRPr lang="en-SG"/>
+              </a:p>
+            </p:txBody>
+          </p:sp>
+          <p:sp>
+            <p:nvSpPr>
+              <p:cNvPr id="118" name="Rectangle 4"/>
+              <p:cNvSpPr/>
+              <p:nvPr/>
+            </p:nvSpPr>
+            <p:spPr>
+              <a:xfrm rot="16200000">
+                <a:off x="1071530" y="1304929"/>
+                <a:ext cx="700291" cy="690781"/>
+              </a:xfrm>
+              <a:custGeom>
+                <a:avLst/>
+                <a:gdLst/>
+                <a:ahLst/>
+                <a:cxnLst/>
+                <a:rect l="l" t="t" r="r" b="b"/>
+                <a:pathLst>
+                  <a:path w="1752603" h="1752600">
+                    <a:moveTo>
+                      <a:pt x="533400" y="0"/>
+                    </a:moveTo>
+                    <a:lnTo>
+                      <a:pt x="533403" y="0"/>
+                    </a:lnTo>
+                    <a:lnTo>
+                      <a:pt x="1066800" y="0"/>
+                    </a:lnTo>
+                    <a:lnTo>
+                      <a:pt x="1752603" y="0"/>
+                    </a:lnTo>
+                    <a:lnTo>
+                      <a:pt x="1752603" y="1752600"/>
+                    </a:lnTo>
+                    <a:lnTo>
+                      <a:pt x="1219203" y="1752600"/>
+                    </a:lnTo>
+                    <a:lnTo>
+                      <a:pt x="533403" y="1752600"/>
+                    </a:lnTo>
+                    <a:lnTo>
+                      <a:pt x="3" y="1752600"/>
+                    </a:lnTo>
+                    <a:lnTo>
+                      <a:pt x="3" y="533430"/>
+                    </a:lnTo>
+                    <a:cubicBezTo>
+                      <a:pt x="0" y="533420"/>
+                      <a:pt x="0" y="533410"/>
+                      <a:pt x="0" y="533400"/>
+                    </a:cubicBezTo>
+                    <a:cubicBezTo>
+                      <a:pt x="0" y="238811"/>
+                      <a:pt x="238811" y="0"/>
+                      <a:pt x="533400" y="0"/>
+                    </a:cubicBezTo>
+                    <a:close/>
+                  </a:path>
+                </a:pathLst>
+              </a:custGeom>
+              <a:noFill/>
+              <a:ln w="76200" cmpd="sng">
+                <a:solidFill>
+                  <a:srgbClr val="0070C0"/>
+                </a:solidFill>
+                <a:miter lim="800000"/>
+              </a:ln>
+            </p:spPr>
+            <p:style>
+              <a:lnRef idx="2">
+                <a:schemeClr val="accent1">
+                  <a:shade val="50000"/>
+                </a:schemeClr>
+              </a:lnRef>
+              <a:fillRef idx="1">
+                <a:schemeClr val="accent1"/>
+              </a:fillRef>
+              <a:effectRef idx="0">
+                <a:schemeClr val="accent1"/>
+              </a:effectRef>
+              <a:fontRef idx="minor">
+                <a:schemeClr val="lt1"/>
+              </a:fontRef>
+            </p:style>
+            <p:txBody>
+              <a:bodyPr rtlCol="0" anchor="ctr"/>
+              <a:lstStyle/>
+              <a:p>
+                <a:pPr algn="ctr"/>
+                <a:endParaRPr lang="en-US"/>
+              </a:p>
+            </p:txBody>
+          </p:sp>
+        </p:grpSp>
         <p:sp>
           <p:nvSpPr>
-            <p:cNvPr id="117" name="Rectangle 116"/>
+            <p:cNvPr id="119" name="Star: 5 Points 118"/>
             <p:cNvSpPr/>
             <p:nvPr/>
           </p:nvSpPr>
           <p:spPr>
             <a:xfrm>
-              <a:off x="1002575" y="1231726"/>
-              <a:ext cx="838200" cy="838200"/>
+              <a:off x="4050476" y="1662781"/>
+              <a:ext cx="527875" cy="503377"/>
             </a:xfrm>
-            <a:prstGeom prst="rect">
+            <a:prstGeom prst="star5">
               <a:avLst/>
             </a:prstGeom>
-            <a:noFill/>
+            <a:solidFill>
+              <a:srgbClr val="0070C0"/>
+            </a:solidFill>
             <a:ln>
               <a:noFill/>
-            </a:ln>
-          </p:spPr>
-          <p:style>
-            <a:lnRef idx="2">
-              <a:schemeClr val="accent1">
-                <a:shade val="50000"/>
-              </a:schemeClr>
-            </a:lnRef>
-            <a:fillRef idx="1">
-              <a:schemeClr val="accent1"/>
-            </a:fillRef>
-            <a:effectRef idx="0">
-              <a:schemeClr val="accent1"/>
-            </a:effectRef>
-            <a:fontRef idx="minor">
-              <a:schemeClr val="lt1"/>
-            </a:fontRef>
-          </p:style>
-          <p:txBody>
-            <a:bodyPr rtlCol="0" anchor="ctr"/>
-            <a:lstStyle/>
-            <a:p>
-              <a:pPr algn="ctr"/>
-              <a:endParaRPr lang="en-SG"/>
-            </a:p>
-          </p:txBody>
-        </p:sp>
-        <p:sp>
-          <p:nvSpPr>
-            <p:cNvPr id="118" name="Rectangle 4"/>
-            <p:cNvSpPr/>
-            <p:nvPr/>
-          </p:nvSpPr>
-          <p:spPr>
-            <a:xfrm rot="16200000">
-              <a:off x="1071530" y="1304929"/>
-              <a:ext cx="700291" cy="690781"/>
-            </a:xfrm>
-            <a:custGeom>
-              <a:avLst/>
-              <a:gdLst/>
-              <a:ahLst/>
-              <a:cxnLst/>
-              <a:rect l="l" t="t" r="r" b="b"/>
-              <a:pathLst>
-                <a:path w="1752603" h="1752600">
-                  <a:moveTo>
-                    <a:pt x="533400" y="0"/>
-                  </a:moveTo>
-                  <a:lnTo>
-                    <a:pt x="533403" y="0"/>
-                  </a:lnTo>
-                  <a:lnTo>
-                    <a:pt x="1066800" y="0"/>
-                  </a:lnTo>
-                  <a:lnTo>
-                    <a:pt x="1752603" y="0"/>
-                  </a:lnTo>
-                  <a:lnTo>
-                    <a:pt x="1752603" y="1752600"/>
-                  </a:lnTo>
-                  <a:lnTo>
-                    <a:pt x="1219203" y="1752600"/>
-                  </a:lnTo>
-                  <a:lnTo>
-                    <a:pt x="533403" y="1752600"/>
-                  </a:lnTo>
-                  <a:lnTo>
-                    <a:pt x="3" y="1752600"/>
-                  </a:lnTo>
-                  <a:lnTo>
-                    <a:pt x="3" y="533430"/>
-                  </a:lnTo>
-                  <a:cubicBezTo>
-                    <a:pt x="0" y="533420"/>
-                    <a:pt x="0" y="533410"/>
-                    <a:pt x="0" y="533400"/>
-                  </a:cubicBezTo>
-                  <a:cubicBezTo>
-                    <a:pt x="0" y="238811"/>
-                    <a:pt x="238811" y="0"/>
-                    <a:pt x="533400" y="0"/>
-                  </a:cubicBezTo>
-                  <a:close/>
-                </a:path>
-              </a:pathLst>
-            </a:custGeom>
-            <a:noFill/>
-            <a:ln w="76200" cmpd="sng">
-              <a:solidFill>
-                <a:srgbClr val="0070C0"/>
-              </a:solidFill>
-              <a:miter lim="800000"/>
             </a:ln>
           </p:spPr>
           <p:style>
@@ -5708,52 +5769,6 @@
           </p:txBody>
         </p:sp>
       </p:grpSp>
-      <p:sp>
-        <p:nvSpPr>
-          <p:cNvPr id="119" name="Star: 5 Points 118"/>
-          <p:cNvSpPr/>
-          <p:nvPr/>
-        </p:nvSpPr>
-        <p:spPr>
-          <a:xfrm>
-            <a:off x="4050476" y="1662781"/>
-            <a:ext cx="527875" cy="503377"/>
-          </a:xfrm>
-          <a:prstGeom prst="star5">
-            <a:avLst/>
-          </a:prstGeom>
-          <a:solidFill>
-            <a:srgbClr val="0070C0"/>
-          </a:solidFill>
-          <a:ln>
-            <a:noFill/>
-          </a:ln>
-        </p:spPr>
-        <p:style>
-          <a:lnRef idx="2">
-            <a:schemeClr val="accent1">
-              <a:shade val="50000"/>
-            </a:schemeClr>
-          </a:lnRef>
-          <a:fillRef idx="1">
-            <a:schemeClr val="accent1"/>
-          </a:fillRef>
-          <a:effectRef idx="0">
-            <a:schemeClr val="accent1"/>
-          </a:effectRef>
-          <a:fontRef idx="minor">
-            <a:schemeClr val="lt1"/>
-          </a:fontRef>
-        </p:style>
-        <p:txBody>
-          <a:bodyPr rtlCol="0" anchor="ctr"/>
-          <a:lstStyle/>
-          <a:p>
-            <a:pPr algn="ctr"/>
-            <a:endParaRPr lang="en-US"/>
-          </a:p>
-        </p:txBody>
-      </p:sp>
       <p:cxnSp>
         <p:nvCxnSpPr>
           <p:cNvPr id="122" name="Straight Connector 121"/>
@@ -6989,6 +7004,220 @@
           </a:p>
         </p:txBody>
       </p:sp>
+      <p:grpSp>
+        <p:nvGrpSpPr>
+          <p:cNvPr id="136" name="Group 135"/>
+          <p:cNvGrpSpPr/>
+          <p:nvPr/>
+        </p:nvGrpSpPr>
+        <p:grpSpPr>
+          <a:xfrm>
+            <a:off x="519636" y="2642105"/>
+            <a:ext cx="838200" cy="838200"/>
+            <a:chOff x="3857848" y="1515362"/>
+            <a:chExt cx="838200" cy="838200"/>
+          </a:xfrm>
+        </p:grpSpPr>
+        <p:cxnSp>
+          <p:nvCxnSpPr>
+            <p:cNvPr id="137" name="Straight Connector 136"/>
+            <p:cNvCxnSpPr>
+              <a:cxnSpLocks/>
+            </p:cNvCxnSpPr>
+            <p:nvPr/>
+          </p:nvCxnSpPr>
+          <p:spPr>
+            <a:xfrm>
+              <a:off x="3939434" y="1725306"/>
+              <a:ext cx="353939" cy="0"/>
+            </a:xfrm>
+            <a:prstGeom prst="line">
+              <a:avLst/>
+            </a:prstGeom>
+            <a:ln w="38100">
+              <a:solidFill>
+                <a:srgbClr val="F79646"/>
+              </a:solidFill>
+            </a:ln>
+          </p:spPr>
+          <p:style>
+            <a:lnRef idx="1">
+              <a:schemeClr val="accent1"/>
+            </a:lnRef>
+            <a:fillRef idx="0">
+              <a:schemeClr val="accent1"/>
+            </a:fillRef>
+            <a:effectRef idx="0">
+              <a:schemeClr val="accent1"/>
+            </a:effectRef>
+            <a:fontRef idx="minor">
+              <a:schemeClr val="tx1"/>
+            </a:fontRef>
+          </p:style>
+        </p:cxnSp>
+        <p:cxnSp>
+          <p:nvCxnSpPr>
+            <p:cNvPr id="138" name="Straight Connector 137"/>
+            <p:cNvCxnSpPr>
+              <a:cxnSpLocks/>
+            </p:cNvCxnSpPr>
+            <p:nvPr/>
+          </p:nvCxnSpPr>
+          <p:spPr>
+            <a:xfrm>
+              <a:off x="3939434" y="1914469"/>
+              <a:ext cx="258808" cy="0"/>
+            </a:xfrm>
+            <a:prstGeom prst="line">
+              <a:avLst/>
+            </a:prstGeom>
+            <a:ln w="38100">
+              <a:solidFill>
+                <a:srgbClr val="F79646"/>
+              </a:solidFill>
+            </a:ln>
+          </p:spPr>
+          <p:style>
+            <a:lnRef idx="1">
+              <a:schemeClr val="accent1"/>
+            </a:lnRef>
+            <a:fillRef idx="0">
+              <a:schemeClr val="accent1"/>
+            </a:fillRef>
+            <a:effectRef idx="0">
+              <a:schemeClr val="accent1"/>
+            </a:effectRef>
+            <a:fontRef idx="minor">
+              <a:schemeClr val="tx1"/>
+            </a:fontRef>
+          </p:style>
+        </p:cxnSp>
+        <p:cxnSp>
+          <p:nvCxnSpPr>
+            <p:cNvPr id="139" name="Straight Connector 138"/>
+            <p:cNvCxnSpPr/>
+            <p:nvPr/>
+          </p:nvCxnSpPr>
+          <p:spPr>
+            <a:xfrm>
+              <a:off x="3939434" y="2102986"/>
+              <a:ext cx="258808" cy="0"/>
+            </a:xfrm>
+            <a:prstGeom prst="line">
+              <a:avLst/>
+            </a:prstGeom>
+            <a:ln w="38100">
+              <a:solidFill>
+                <a:srgbClr val="F79646"/>
+              </a:solidFill>
+            </a:ln>
+          </p:spPr>
+          <p:style>
+            <a:lnRef idx="1">
+              <a:schemeClr val="accent1"/>
+            </a:lnRef>
+            <a:fillRef idx="0">
+              <a:schemeClr val="accent1"/>
+            </a:fillRef>
+            <a:effectRef idx="0">
+              <a:schemeClr val="accent1"/>
+            </a:effectRef>
+            <a:fontRef idx="minor">
+              <a:schemeClr val="tx1"/>
+            </a:fontRef>
+          </p:style>
+        </p:cxnSp>
+        <p:sp>
+          <p:nvSpPr>
+            <p:cNvPr id="142" name="Rectangle 141"/>
+            <p:cNvSpPr/>
+            <p:nvPr/>
+          </p:nvSpPr>
+          <p:spPr>
+            <a:xfrm>
+              <a:off x="3857848" y="1515362"/>
+              <a:ext cx="838200" cy="838200"/>
+            </a:xfrm>
+            <a:prstGeom prst="rect">
+              <a:avLst/>
+            </a:prstGeom>
+            <a:noFill/>
+            <a:ln>
+              <a:noFill/>
+            </a:ln>
+          </p:spPr>
+          <p:style>
+            <a:lnRef idx="2">
+              <a:schemeClr val="accent1">
+                <a:shade val="50000"/>
+              </a:schemeClr>
+            </a:lnRef>
+            <a:fillRef idx="1">
+              <a:schemeClr val="accent1"/>
+            </a:fillRef>
+            <a:effectRef idx="0">
+              <a:schemeClr val="accent1"/>
+            </a:effectRef>
+            <a:fontRef idx="minor">
+              <a:schemeClr val="lt1"/>
+            </a:fontRef>
+          </p:style>
+          <p:txBody>
+            <a:bodyPr rtlCol="0" anchor="ctr"/>
+            <a:lstStyle/>
+            <a:p>
+              <a:pPr algn="ctr"/>
+              <a:endParaRPr lang="en-SG"/>
+            </a:p>
+          </p:txBody>
+        </p:sp>
+        <p:sp>
+          <p:nvSpPr>
+            <p:cNvPr id="141" name="Star: 5 Points 140"/>
+            <p:cNvSpPr/>
+            <p:nvPr/>
+          </p:nvSpPr>
+          <p:spPr>
+            <a:xfrm>
+              <a:off x="4050476" y="1662781"/>
+              <a:ext cx="527875" cy="503377"/>
+            </a:xfrm>
+            <a:prstGeom prst="star5">
+              <a:avLst/>
+            </a:prstGeom>
+            <a:solidFill>
+              <a:srgbClr val="0070C0"/>
+            </a:solidFill>
+            <a:ln>
+              <a:noFill/>
+            </a:ln>
+          </p:spPr>
+          <p:style>
+            <a:lnRef idx="2">
+              <a:schemeClr val="accent1">
+                <a:shade val="50000"/>
+              </a:schemeClr>
+            </a:lnRef>
+            <a:fillRef idx="1">
+              <a:schemeClr val="accent1"/>
+            </a:fillRef>
+            <a:effectRef idx="0">
+              <a:schemeClr val="accent1"/>
+            </a:effectRef>
+            <a:fontRef idx="minor">
+              <a:schemeClr val="lt1"/>
+            </a:fontRef>
+          </p:style>
+          <p:txBody>
+            <a:bodyPr rtlCol="0" anchor="ctr"/>
+            <a:lstStyle/>
+            <a:p>
+              <a:pPr algn="ctr"/>
+              <a:endParaRPr lang="en-US"/>
+            </a:p>
+          </p:txBody>
+        </p:sp>
+      </p:grpSp>
     </p:spTree>
     <p:extLst>
       <p:ext uri="{BB962C8B-B14F-4D97-AF65-F5344CB8AC3E}">

</xml_diff>